<commit_message>
uploaded updates to codes and folder
</commit_message>
<xml_diff>
--- a/Guidance of Reproducing the paper.pptx
+++ b/Guidance of Reproducing the paper.pptx
@@ -19,9 +19,9 @@
     <p:sldId id="270" r:id="rId13"/>
     <p:sldId id="271" r:id="rId14"/>
     <p:sldId id="272" r:id="rId15"/>
-    <p:sldId id="273" r:id="rId16"/>
-    <p:sldId id="274" r:id="rId17"/>
-    <p:sldId id="275" r:id="rId18"/>
+    <p:sldId id="275" r:id="rId16"/>
+    <p:sldId id="273" r:id="rId17"/>
+    <p:sldId id="274" r:id="rId18"/>
     <p:sldId id="276" r:id="rId19"/>
     <p:sldId id="277" r:id="rId20"/>
     <p:sldId id="279" r:id="rId21"/>
@@ -124,6 +124,11 @@
       </a:defRPr>
     </a:lvl9pPr>
   </p:defaultTextStyle>
+  <p:extLst>
+    <p:ext uri="{EFAFB233-063F-42B5-8137-9DF3F51BA10A}">
+      <p15:sldGuideLst xmlns:p15="http://schemas.microsoft.com/office/powerpoint/2012/main"/>
+    </p:ext>
+  </p:extLst>
 </p:presentation>
 </file>
 
@@ -274,7 +279,7 @@
           <a:p>
             <a:fld id="{09C7B164-667E-498A-A76B-16D9AA8E7463}" type="datetimeFigureOut">
               <a:rPr lang="en-US" smtClean="0"/>
-              <a:t>12/10/2020</a:t>
+              <a:t>12/12/2020</a:t>
             </a:fld>
             <a:endParaRPr lang="en-US"/>
           </a:p>
@@ -472,7 +477,7 @@
           <a:p>
             <a:fld id="{09C7B164-667E-498A-A76B-16D9AA8E7463}" type="datetimeFigureOut">
               <a:rPr lang="en-US" smtClean="0"/>
-              <a:t>12/10/2020</a:t>
+              <a:t>12/12/2020</a:t>
             </a:fld>
             <a:endParaRPr lang="en-US"/>
           </a:p>
@@ -680,7 +685,7 @@
           <a:p>
             <a:fld id="{09C7B164-667E-498A-A76B-16D9AA8E7463}" type="datetimeFigureOut">
               <a:rPr lang="en-US" smtClean="0"/>
-              <a:t>12/10/2020</a:t>
+              <a:t>12/12/2020</a:t>
             </a:fld>
             <a:endParaRPr lang="en-US"/>
           </a:p>
@@ -878,7 +883,7 @@
           <a:p>
             <a:fld id="{09C7B164-667E-498A-A76B-16D9AA8E7463}" type="datetimeFigureOut">
               <a:rPr lang="en-US" smtClean="0"/>
-              <a:t>12/10/2020</a:t>
+              <a:t>12/12/2020</a:t>
             </a:fld>
             <a:endParaRPr lang="en-US"/>
           </a:p>
@@ -1153,7 +1158,7 @@
           <a:p>
             <a:fld id="{09C7B164-667E-498A-A76B-16D9AA8E7463}" type="datetimeFigureOut">
               <a:rPr lang="en-US" smtClean="0"/>
-              <a:t>12/10/2020</a:t>
+              <a:t>12/12/2020</a:t>
             </a:fld>
             <a:endParaRPr lang="en-US"/>
           </a:p>
@@ -1418,7 +1423,7 @@
           <a:p>
             <a:fld id="{09C7B164-667E-498A-A76B-16D9AA8E7463}" type="datetimeFigureOut">
               <a:rPr lang="en-US" smtClean="0"/>
-              <a:t>12/10/2020</a:t>
+              <a:t>12/12/2020</a:t>
             </a:fld>
             <a:endParaRPr lang="en-US"/>
           </a:p>
@@ -1830,7 +1835,7 @@
           <a:p>
             <a:fld id="{09C7B164-667E-498A-A76B-16D9AA8E7463}" type="datetimeFigureOut">
               <a:rPr lang="en-US" smtClean="0"/>
-              <a:t>12/10/2020</a:t>
+              <a:t>12/12/2020</a:t>
             </a:fld>
             <a:endParaRPr lang="en-US"/>
           </a:p>
@@ -1971,7 +1976,7 @@
           <a:p>
             <a:fld id="{09C7B164-667E-498A-A76B-16D9AA8E7463}" type="datetimeFigureOut">
               <a:rPr lang="en-US" smtClean="0"/>
-              <a:t>12/10/2020</a:t>
+              <a:t>12/12/2020</a:t>
             </a:fld>
             <a:endParaRPr lang="en-US"/>
           </a:p>
@@ -2084,7 +2089,7 @@
           <a:p>
             <a:fld id="{09C7B164-667E-498A-A76B-16D9AA8E7463}" type="datetimeFigureOut">
               <a:rPr lang="en-US" smtClean="0"/>
-              <a:t>12/10/2020</a:t>
+              <a:t>12/12/2020</a:t>
             </a:fld>
             <a:endParaRPr lang="en-US"/>
           </a:p>
@@ -2395,7 +2400,7 @@
           <a:p>
             <a:fld id="{09C7B164-667E-498A-A76B-16D9AA8E7463}" type="datetimeFigureOut">
               <a:rPr lang="en-US" smtClean="0"/>
-              <a:t>12/10/2020</a:t>
+              <a:t>12/12/2020</a:t>
             </a:fld>
             <a:endParaRPr lang="en-US"/>
           </a:p>
@@ -2683,7 +2688,7 @@
           <a:p>
             <a:fld id="{09C7B164-667E-498A-A76B-16D9AA8E7463}" type="datetimeFigureOut">
               <a:rPr lang="en-US" smtClean="0"/>
-              <a:t>12/10/2020</a:t>
+              <a:t>12/12/2020</a:t>
             </a:fld>
             <a:endParaRPr lang="en-US"/>
           </a:p>
@@ -2924,7 +2929,7 @@
           <a:p>
             <a:fld id="{09C7B164-667E-498A-A76B-16D9AA8E7463}" type="datetimeFigureOut">
               <a:rPr lang="en-US" smtClean="0"/>
-              <a:t>12/10/2020</a:t>
+              <a:t>12/12/2020</a:t>
             </a:fld>
             <a:endParaRPr lang="en-US"/>
           </a:p>
@@ -4106,6 +4111,160 @@
       </p:grpSpPr>
       <p:sp>
         <p:nvSpPr>
+          <p:cNvPr id="2" name="Title 1">
+            <a:extLst>
+              <a:ext uri="{FF2B5EF4-FFF2-40B4-BE49-F238E27FC236}">
+                <a16:creationId xmlns:a16="http://schemas.microsoft.com/office/drawing/2014/main" id="{0BDF636E-12ED-444D-9925-8BE1524B2E96}"/>
+              </a:ext>
+            </a:extLst>
+          </p:cNvPr>
+          <p:cNvSpPr>
+            <a:spLocks noGrp="1"/>
+          </p:cNvSpPr>
+          <p:nvPr>
+            <p:ph type="title"/>
+          </p:nvPr>
+        </p:nvSpPr>
+        <p:spPr/>
+        <p:txBody>
+          <a:bodyPr/>
+          <a:lstStyle/>
+          <a:p>
+            <a:r>
+              <a:rPr lang="en-US" dirty="0"/>
+              <a:t>Extract Strongest Context Indicator As the Definition</a:t>
+            </a:r>
+          </a:p>
+        </p:txBody>
+      </p:sp>
+      <p:sp>
+        <p:nvSpPr>
+          <p:cNvPr id="3" name="Content Placeholder 2">
+            <a:extLst>
+              <a:ext uri="{FF2B5EF4-FFF2-40B4-BE49-F238E27FC236}">
+                <a16:creationId xmlns:a16="http://schemas.microsoft.com/office/drawing/2014/main" id="{858703D1-D142-4A04-8A38-CDD0D1322DD2}"/>
+              </a:ext>
+            </a:extLst>
+          </p:cNvPr>
+          <p:cNvSpPr>
+            <a:spLocks noGrp="1"/>
+          </p:cNvSpPr>
+          <p:nvPr>
+            <p:ph idx="1"/>
+          </p:nvPr>
+        </p:nvSpPr>
+        <p:spPr/>
+        <p:txBody>
+          <a:bodyPr/>
+          <a:lstStyle/>
+          <a:p>
+            <a:r>
+              <a:rPr lang="en-US" dirty="0"/>
+              <a:t>With the weighting function for each context unit (</a:t>
+            </a:r>
+            <a:r>
+              <a:rPr lang="en-US" dirty="0" err="1"/>
+              <a:t>u</a:t>
+            </a:r>
+            <a:r>
+              <a:rPr lang="en-US" baseline="-25000" dirty="0" err="1"/>
+              <a:t>i</a:t>
+            </a:r>
+            <a:r>
+              <a:rPr lang="en-US" dirty="0"/>
+              <a:t>) of a pattern, compute </a:t>
+            </a:r>
+            <a:r>
+              <a:rPr lang="en-US" dirty="0" err="1"/>
+              <a:t>w</a:t>
+            </a:r>
+            <a:r>
+              <a:rPr lang="en-US" baseline="-25000" dirty="0" err="1"/>
+              <a:t>i</a:t>
+            </a:r>
+            <a:r>
+              <a:rPr lang="en-US" dirty="0"/>
+              <a:t> = w(</a:t>
+            </a:r>
+            <a:r>
+              <a:rPr lang="en-US" dirty="0" err="1"/>
+              <a:t>u</a:t>
+            </a:r>
+            <a:r>
+              <a:rPr lang="en-US" baseline="-25000" dirty="0" err="1"/>
+              <a:t>i</a:t>
+            </a:r>
+            <a:r>
+              <a:rPr lang="en-US" dirty="0"/>
+              <a:t>, p</a:t>
+            </a:r>
+            <a:r>
+              <a:rPr lang="el-GR" baseline="-25000" dirty="0"/>
+              <a:t>α</a:t>
+            </a:r>
+            <a:r>
+              <a:rPr lang="en-US" dirty="0"/>
+              <a:t>), rank </a:t>
+            </a:r>
+            <a:r>
+              <a:rPr lang="en-US" dirty="0" err="1"/>
+              <a:t>u</a:t>
+            </a:r>
+            <a:r>
+              <a:rPr lang="en-US" baseline="-25000" dirty="0" err="1"/>
+              <a:t>i</a:t>
+            </a:r>
+            <a:r>
+              <a:rPr lang="en-US" dirty="0"/>
+              <a:t> ∈ U with </a:t>
+            </a:r>
+            <a:r>
+              <a:rPr lang="en-US" dirty="0" err="1"/>
+              <a:t>w</a:t>
+            </a:r>
+            <a:r>
+              <a:rPr lang="en-US" baseline="-25000" dirty="0" err="1"/>
+              <a:t>i</a:t>
+            </a:r>
+            <a:r>
+              <a:rPr lang="en-US" dirty="0"/>
+              <a:t> in descending order and select the top k units.</a:t>
+            </a:r>
+          </a:p>
+        </p:txBody>
+      </p:sp>
+    </p:spTree>
+    <p:extLst>
+      <p:ext uri="{BB962C8B-B14F-4D97-AF65-F5344CB8AC3E}">
+        <p14:creationId xmlns:p14="http://schemas.microsoft.com/office/powerpoint/2010/main" val="1203795132"/>
+      </p:ext>
+    </p:extLst>
+  </p:cSld>
+  <p:clrMapOvr>
+    <a:masterClrMapping/>
+  </p:clrMapOvr>
+</p:sld>
+</file>
+
+<file path=ppt/slides/slide16.xml><?xml version="1.0" encoding="utf-8"?>
+<p:sld xmlns:a="http://schemas.openxmlformats.org/drawingml/2006/main" xmlns:r="http://schemas.openxmlformats.org/officeDocument/2006/relationships" xmlns:p="http://schemas.openxmlformats.org/presentationml/2006/main">
+  <p:cSld>
+    <p:spTree>
+      <p:nvGrpSpPr>
+        <p:cNvPr id="1" name=""/>
+        <p:cNvGrpSpPr/>
+        <p:nvPr/>
+      </p:nvGrpSpPr>
+      <p:grpSpPr>
+        <a:xfrm>
+          <a:off x="0" y="0"/>
+          <a:ext cx="0" cy="0"/>
+          <a:chOff x="0" y="0"/>
+          <a:chExt cx="0" cy="0"/>
+        </a:xfrm>
+      </p:grpSpPr>
+      <p:sp>
+        <p:nvSpPr>
           <p:cNvPr id="4" name="Title 3">
             <a:extLst>
               <a:ext uri="{FF2B5EF4-FFF2-40B4-BE49-F238E27FC236}">
@@ -4170,7 +4329,7 @@
 </p:sld>
 </file>
 
-<file path=ppt/slides/slide16.xml><?xml version="1.0" encoding="utf-8"?>
+<file path=ppt/slides/slide17.xml><?xml version="1.0" encoding="utf-8"?>
 <p:sld xmlns:a="http://schemas.openxmlformats.org/drawingml/2006/main" xmlns:r="http://schemas.openxmlformats.org/officeDocument/2006/relationships" xmlns:p="http://schemas.openxmlformats.org/presentationml/2006/main">
   <p:cSld>
     <p:spTree>
@@ -4382,160 +4541,6 @@
 </p:sld>
 </file>
 
-<file path=ppt/slides/slide17.xml><?xml version="1.0" encoding="utf-8"?>
-<p:sld xmlns:a="http://schemas.openxmlformats.org/drawingml/2006/main" xmlns:r="http://schemas.openxmlformats.org/officeDocument/2006/relationships" xmlns:p="http://schemas.openxmlformats.org/presentationml/2006/main">
-  <p:cSld>
-    <p:spTree>
-      <p:nvGrpSpPr>
-        <p:cNvPr id="1" name=""/>
-        <p:cNvGrpSpPr/>
-        <p:nvPr/>
-      </p:nvGrpSpPr>
-      <p:grpSpPr>
-        <a:xfrm>
-          <a:off x="0" y="0"/>
-          <a:ext cx="0" cy="0"/>
-          <a:chOff x="0" y="0"/>
-          <a:chExt cx="0" cy="0"/>
-        </a:xfrm>
-      </p:grpSpPr>
-      <p:sp>
-        <p:nvSpPr>
-          <p:cNvPr id="2" name="Title 1">
-            <a:extLst>
-              <a:ext uri="{FF2B5EF4-FFF2-40B4-BE49-F238E27FC236}">
-                <a16:creationId xmlns:a16="http://schemas.microsoft.com/office/drawing/2014/main" id="{0BDF636E-12ED-444D-9925-8BE1524B2E96}"/>
-              </a:ext>
-            </a:extLst>
-          </p:cNvPr>
-          <p:cNvSpPr>
-            <a:spLocks noGrp="1"/>
-          </p:cNvSpPr>
-          <p:nvPr>
-            <p:ph type="title"/>
-          </p:nvPr>
-        </p:nvSpPr>
-        <p:spPr/>
-        <p:txBody>
-          <a:bodyPr/>
-          <a:lstStyle/>
-          <a:p>
-            <a:r>
-              <a:rPr lang="en-US" dirty="0"/>
-              <a:t>Extract Strongest Context Indicator</a:t>
-            </a:r>
-          </a:p>
-        </p:txBody>
-      </p:sp>
-      <p:sp>
-        <p:nvSpPr>
-          <p:cNvPr id="3" name="Content Placeholder 2">
-            <a:extLst>
-              <a:ext uri="{FF2B5EF4-FFF2-40B4-BE49-F238E27FC236}">
-                <a16:creationId xmlns:a16="http://schemas.microsoft.com/office/drawing/2014/main" id="{858703D1-D142-4A04-8A38-CDD0D1322DD2}"/>
-              </a:ext>
-            </a:extLst>
-          </p:cNvPr>
-          <p:cNvSpPr>
-            <a:spLocks noGrp="1"/>
-          </p:cNvSpPr>
-          <p:nvPr>
-            <p:ph idx="1"/>
-          </p:nvPr>
-        </p:nvSpPr>
-        <p:spPr/>
-        <p:txBody>
-          <a:bodyPr/>
-          <a:lstStyle/>
-          <a:p>
-            <a:r>
-              <a:rPr lang="en-US" dirty="0"/>
-              <a:t>With the weighting function for each context unit (</a:t>
-            </a:r>
-            <a:r>
-              <a:rPr lang="en-US" dirty="0" err="1"/>
-              <a:t>u</a:t>
-            </a:r>
-            <a:r>
-              <a:rPr lang="en-US" baseline="-25000" dirty="0" err="1"/>
-              <a:t>i</a:t>
-            </a:r>
-            <a:r>
-              <a:rPr lang="en-US" dirty="0"/>
-              <a:t>) of a pattern, compute </a:t>
-            </a:r>
-            <a:r>
-              <a:rPr lang="en-US" dirty="0" err="1"/>
-              <a:t>w</a:t>
-            </a:r>
-            <a:r>
-              <a:rPr lang="en-US" baseline="-25000" dirty="0" err="1"/>
-              <a:t>i</a:t>
-            </a:r>
-            <a:r>
-              <a:rPr lang="en-US" dirty="0"/>
-              <a:t> = w(</a:t>
-            </a:r>
-            <a:r>
-              <a:rPr lang="en-US" dirty="0" err="1"/>
-              <a:t>u</a:t>
-            </a:r>
-            <a:r>
-              <a:rPr lang="en-US" baseline="-25000" dirty="0" err="1"/>
-              <a:t>i</a:t>
-            </a:r>
-            <a:r>
-              <a:rPr lang="en-US" dirty="0"/>
-              <a:t>, p</a:t>
-            </a:r>
-            <a:r>
-              <a:rPr lang="el-GR" baseline="-25000" dirty="0"/>
-              <a:t>α</a:t>
-            </a:r>
-            <a:r>
-              <a:rPr lang="en-US" dirty="0"/>
-              <a:t>), rank </a:t>
-            </a:r>
-            <a:r>
-              <a:rPr lang="en-US" dirty="0" err="1"/>
-              <a:t>u</a:t>
-            </a:r>
-            <a:r>
-              <a:rPr lang="en-US" baseline="-25000" dirty="0" err="1"/>
-              <a:t>i</a:t>
-            </a:r>
-            <a:r>
-              <a:rPr lang="en-US" dirty="0"/>
-              <a:t> ∈ U with </a:t>
-            </a:r>
-            <a:r>
-              <a:rPr lang="en-US" dirty="0" err="1"/>
-              <a:t>w</a:t>
-            </a:r>
-            <a:r>
-              <a:rPr lang="en-US" baseline="-25000" dirty="0" err="1"/>
-              <a:t>i</a:t>
-            </a:r>
-            <a:r>
-              <a:rPr lang="en-US" dirty="0"/>
-              <a:t> in descending order and select the top k units.</a:t>
-            </a:r>
-          </a:p>
-        </p:txBody>
-      </p:sp>
-    </p:spTree>
-    <p:extLst>
-      <p:ext uri="{BB962C8B-B14F-4D97-AF65-F5344CB8AC3E}">
-        <p14:creationId xmlns:p14="http://schemas.microsoft.com/office/powerpoint/2010/main" val="1203795132"/>
-      </p:ext>
-    </p:extLst>
-  </p:cSld>
-  <p:clrMapOvr>
-    <a:masterClrMapping/>
-  </p:clrMapOvr>
-</p:sld>
-</file>
-
 <file path=ppt/slides/slide18.xml><?xml version="1.0" encoding="utf-8"?>
 <p:sld xmlns:a="http://schemas.openxmlformats.org/drawingml/2006/main" xmlns:r="http://schemas.openxmlformats.org/officeDocument/2006/relationships" xmlns:p="http://schemas.openxmlformats.org/presentationml/2006/main">
   <p:cSld>
@@ -5609,7 +5614,7 @@
                   <a:schemeClr val="tx1"/>
                 </a:solidFill>
               </a:rPr>
-              <a:t>Annotation of Given Author Pattern by Context Units with Top Weights</a:t>
+              <a:t>Annotation of Given Pattern by Context Units with Top Weights</a:t>
             </a:r>
           </a:p>
         </p:txBody>
@@ -5668,7 +5673,7 @@
                   <a:schemeClr val="tx1"/>
                 </a:solidFill>
               </a:rPr>
-              <a:t>Find representative titles of given author </a:t>
+              <a:t>Find representative titles of given pattern</a:t>
             </a:r>
           </a:p>
         </p:txBody>
@@ -5727,8 +5732,21 @@
                   <a:schemeClr val="tx1"/>
                 </a:solidFill>
               </a:rPr>
-              <a:t>Find synonyms of given author </a:t>
-            </a:r>
+              <a:t>Find synonyms of </a:t>
+            </a:r>
+            <a:r>
+              <a:rPr lang="en-US">
+                <a:solidFill>
+                  <a:schemeClr val="tx1"/>
+                </a:solidFill>
+              </a:rPr>
+              <a:t>given pattern </a:t>
+            </a:r>
+            <a:endParaRPr lang="en-US" dirty="0">
+              <a:solidFill>
+                <a:schemeClr val="tx1"/>
+              </a:solidFill>
+            </a:endParaRPr>
           </a:p>
         </p:txBody>
       </p:sp>
@@ -6792,7 +6810,7 @@
             <a:pPr lvl="1"/>
             <a:r>
               <a:rPr lang="en-US" dirty="0"/>
-              <a:t>The proportion of transactions containing the patter in the entire transaction dataset</a:t>
+              <a:t>The proportion of transactions containing the pattern in the entire transaction dataset</a:t>
             </a:r>
           </a:p>
           <a:p>

</xml_diff>